<commit_message>
removed console from slides
</commit_message>
<xml_diff>
--- a/platform/examples/examples.pythonSync/docs/Examples_PythonSync.pptx
+++ b/platform/examples/examples.pythonSync/docs/Examples_PythonSync.pptx
@@ -3770,92 +3770,6 @@
       </p:sp>
       <p:sp>
         <p:nvSpPr>
-          <p:cNvPr id="53" name="TextBox 33">
-            <a:extLst>
-              <a:ext uri="{FF2B5EF4-FFF2-40B4-BE49-F238E27FC236}">
-                <a16:creationId xmlns:a16="http://schemas.microsoft.com/office/drawing/2014/main" id="{35F29DC6-EF34-4587-956B-1DB72AC0E8EB}"/>
-              </a:ext>
-            </a:extLst>
-          </p:cNvPr>
-          <p:cNvSpPr txBox="1"/>
-          <p:nvPr/>
-        </p:nvSpPr>
-        <p:spPr>
-          <a:xfrm>
-            <a:off x="10273559" y="2973672"/>
-            <a:ext cx="1280562" cy="476488"/>
-          </a:xfrm>
-          <a:prstGeom prst="hexagon">
-            <a:avLst/>
-          </a:prstGeom>
-          <a:noFill/>
-          <a:ln>
-            <a:solidFill>
-              <a:schemeClr val="accent1"/>
-            </a:solidFill>
-          </a:ln>
-        </p:spPr>
-        <p:txBody>
-          <a:bodyPr wrap="none" rtlCol="0">
-            <a:spAutoFit/>
-          </a:bodyPr>
-          <a:lstStyle/>
-          <a:p>
-            <a:r>
-              <a:rPr lang="en-GB" b="1" dirty="0"/>
-              <a:t>Console </a:t>
-            </a:r>
-            <a:endParaRPr lang="de-DE" dirty="0"/>
-          </a:p>
-        </p:txBody>
-      </p:sp>
-      <p:cxnSp>
-        <p:nvCxnSpPr>
-          <p:cNvPr id="64" name="Connector: Elbow 38">
-            <a:extLst>
-              <a:ext uri="{FF2B5EF4-FFF2-40B4-BE49-F238E27FC236}">
-                <a16:creationId xmlns:a16="http://schemas.microsoft.com/office/drawing/2014/main" id="{EFB9753E-E206-4E99-9511-91B4CDFED162}"/>
-              </a:ext>
-            </a:extLst>
-          </p:cNvPr>
-          <p:cNvCxnSpPr>
-            <a:cxnSpLocks/>
-            <a:stCxn id="41" idx="3"/>
-            <a:endCxn id="53" idx="3"/>
-          </p:cNvCxnSpPr>
-          <p:nvPr/>
-        </p:nvCxnSpPr>
-        <p:spPr>
-          <a:xfrm flipV="1">
-            <a:off x="9594283" y="3211916"/>
-            <a:ext cx="679276" cy="1274"/>
-          </a:xfrm>
-          <a:prstGeom prst="bentConnector3">
-            <a:avLst>
-              <a:gd name="adj1" fmla="val 50000"/>
-            </a:avLst>
-          </a:prstGeom>
-          <a:ln>
-            <a:tailEnd type="triangle"/>
-          </a:ln>
-        </p:spPr>
-        <p:style>
-          <a:lnRef idx="1">
-            <a:schemeClr val="accent1"/>
-          </a:lnRef>
-          <a:fillRef idx="0">
-            <a:schemeClr val="accent1"/>
-          </a:fillRef>
-          <a:effectRef idx="0">
-            <a:schemeClr val="accent1"/>
-          </a:effectRef>
-          <a:fontRef idx="minor">
-            <a:schemeClr val="tx1"/>
-          </a:fontRef>
-        </p:style>
-      </p:cxnSp>
-      <p:sp>
-        <p:nvSpPr>
           <p:cNvPr id="72" name="TextBox 24">
             <a:extLst>
               <a:ext uri="{FF2B5EF4-FFF2-40B4-BE49-F238E27FC236}">

</xml_diff>

<commit_message>
#71 example as MQTT regression test
</commit_message>
<xml_diff>
--- a/platform/examples/examples.pythonSync/docs/Examples_PythonSync.pptx
+++ b/platform/examples/examples.pythonSync/docs/Examples_PythonSync.pptx
@@ -261,7 +261,7 @@
           <a:p>
             <a:fld id="{D5B82AE6-E612-48AC-BCA1-8D558D7A7716}" type="datetimeFigureOut">
               <a:rPr lang="en-DE" smtClean="0"/>
-              <a:t>28/11/2022</a:t>
+              <a:t>31/12/2022</a:t>
             </a:fld>
             <a:endParaRPr lang="en-DE"/>
           </a:p>
@@ -315,7 +315,7 @@
           <a:p>
             <a:fld id="{A0229028-759D-4210-9927-1485AD01E42E}" type="slidenum">
               <a:rPr lang="en-DE" smtClean="0"/>
-              <a:t>‹Nr.›</a:t>
+              <a:t>‹#›</a:t>
             </a:fld>
             <a:endParaRPr lang="en-DE"/>
           </a:p>
@@ -461,7 +461,7 @@
           <a:p>
             <a:fld id="{D5B82AE6-E612-48AC-BCA1-8D558D7A7716}" type="datetimeFigureOut">
               <a:rPr lang="en-DE" smtClean="0"/>
-              <a:t>28/11/2022</a:t>
+              <a:t>31/12/2022</a:t>
             </a:fld>
             <a:endParaRPr lang="en-DE"/>
           </a:p>
@@ -515,7 +515,7 @@
           <a:p>
             <a:fld id="{A0229028-759D-4210-9927-1485AD01E42E}" type="slidenum">
               <a:rPr lang="en-DE" smtClean="0"/>
-              <a:t>‹Nr.›</a:t>
+              <a:t>‹#›</a:t>
             </a:fld>
             <a:endParaRPr lang="en-DE"/>
           </a:p>
@@ -671,7 +671,7 @@
           <a:p>
             <a:fld id="{D5B82AE6-E612-48AC-BCA1-8D558D7A7716}" type="datetimeFigureOut">
               <a:rPr lang="en-DE" smtClean="0"/>
-              <a:t>28/11/2022</a:t>
+              <a:t>31/12/2022</a:t>
             </a:fld>
             <a:endParaRPr lang="en-DE"/>
           </a:p>
@@ -725,7 +725,7 @@
           <a:p>
             <a:fld id="{A0229028-759D-4210-9927-1485AD01E42E}" type="slidenum">
               <a:rPr lang="en-DE" smtClean="0"/>
-              <a:t>‹Nr.›</a:t>
+              <a:t>‹#›</a:t>
             </a:fld>
             <a:endParaRPr lang="en-DE"/>
           </a:p>
@@ -871,7 +871,7 @@
           <a:p>
             <a:fld id="{D5B82AE6-E612-48AC-BCA1-8D558D7A7716}" type="datetimeFigureOut">
               <a:rPr lang="en-DE" smtClean="0"/>
-              <a:t>28/11/2022</a:t>
+              <a:t>31/12/2022</a:t>
             </a:fld>
             <a:endParaRPr lang="en-DE"/>
           </a:p>
@@ -925,7 +925,7 @@
           <a:p>
             <a:fld id="{A0229028-759D-4210-9927-1485AD01E42E}" type="slidenum">
               <a:rPr lang="en-DE" smtClean="0"/>
-              <a:t>‹Nr.›</a:t>
+              <a:t>‹#›</a:t>
             </a:fld>
             <a:endParaRPr lang="en-DE"/>
           </a:p>
@@ -1147,7 +1147,7 @@
           <a:p>
             <a:fld id="{D5B82AE6-E612-48AC-BCA1-8D558D7A7716}" type="datetimeFigureOut">
               <a:rPr lang="en-DE" smtClean="0"/>
-              <a:t>28/11/2022</a:t>
+              <a:t>31/12/2022</a:t>
             </a:fld>
             <a:endParaRPr lang="en-DE"/>
           </a:p>
@@ -1201,7 +1201,7 @@
           <a:p>
             <a:fld id="{A0229028-759D-4210-9927-1485AD01E42E}" type="slidenum">
               <a:rPr lang="en-DE" smtClean="0"/>
-              <a:t>‹Nr.›</a:t>
+              <a:t>‹#›</a:t>
             </a:fld>
             <a:endParaRPr lang="en-DE"/>
           </a:p>
@@ -1415,7 +1415,7 @@
           <a:p>
             <a:fld id="{D5B82AE6-E612-48AC-BCA1-8D558D7A7716}" type="datetimeFigureOut">
               <a:rPr lang="en-DE" smtClean="0"/>
-              <a:t>28/11/2022</a:t>
+              <a:t>31/12/2022</a:t>
             </a:fld>
             <a:endParaRPr lang="en-DE"/>
           </a:p>
@@ -1469,7 +1469,7 @@
           <a:p>
             <a:fld id="{A0229028-759D-4210-9927-1485AD01E42E}" type="slidenum">
               <a:rPr lang="en-DE" smtClean="0"/>
-              <a:t>‹Nr.›</a:t>
+              <a:t>‹#›</a:t>
             </a:fld>
             <a:endParaRPr lang="en-DE"/>
           </a:p>
@@ -1830,7 +1830,7 @@
           <a:p>
             <a:fld id="{D5B82AE6-E612-48AC-BCA1-8D558D7A7716}" type="datetimeFigureOut">
               <a:rPr lang="en-DE" smtClean="0"/>
-              <a:t>28/11/2022</a:t>
+              <a:t>31/12/2022</a:t>
             </a:fld>
             <a:endParaRPr lang="en-DE"/>
           </a:p>
@@ -1884,7 +1884,7 @@
           <a:p>
             <a:fld id="{A0229028-759D-4210-9927-1485AD01E42E}" type="slidenum">
               <a:rPr lang="en-DE" smtClean="0"/>
-              <a:t>‹Nr.›</a:t>
+              <a:t>‹#›</a:t>
             </a:fld>
             <a:endParaRPr lang="en-DE"/>
           </a:p>
@@ -1972,7 +1972,7 @@
           <a:p>
             <a:fld id="{D5B82AE6-E612-48AC-BCA1-8D558D7A7716}" type="datetimeFigureOut">
               <a:rPr lang="en-DE" smtClean="0"/>
-              <a:t>28/11/2022</a:t>
+              <a:t>31/12/2022</a:t>
             </a:fld>
             <a:endParaRPr lang="en-DE"/>
           </a:p>
@@ -2026,7 +2026,7 @@
           <a:p>
             <a:fld id="{A0229028-759D-4210-9927-1485AD01E42E}" type="slidenum">
               <a:rPr lang="en-DE" smtClean="0"/>
-              <a:t>‹Nr.›</a:t>
+              <a:t>‹#›</a:t>
             </a:fld>
             <a:endParaRPr lang="en-DE"/>
           </a:p>
@@ -2085,7 +2085,7 @@
           <a:p>
             <a:fld id="{D5B82AE6-E612-48AC-BCA1-8D558D7A7716}" type="datetimeFigureOut">
               <a:rPr lang="en-DE" smtClean="0"/>
-              <a:t>28/11/2022</a:t>
+              <a:t>31/12/2022</a:t>
             </a:fld>
             <a:endParaRPr lang="en-DE"/>
           </a:p>
@@ -2139,7 +2139,7 @@
           <a:p>
             <a:fld id="{A0229028-759D-4210-9927-1485AD01E42E}" type="slidenum">
               <a:rPr lang="en-DE" smtClean="0"/>
-              <a:t>‹Nr.›</a:t>
+              <a:t>‹#›</a:t>
             </a:fld>
             <a:endParaRPr lang="en-DE"/>
           </a:p>
@@ -2398,7 +2398,7 @@
           <a:p>
             <a:fld id="{D5B82AE6-E612-48AC-BCA1-8D558D7A7716}" type="datetimeFigureOut">
               <a:rPr lang="en-DE" smtClean="0"/>
-              <a:t>28/11/2022</a:t>
+              <a:t>31/12/2022</a:t>
             </a:fld>
             <a:endParaRPr lang="en-DE"/>
           </a:p>
@@ -2452,7 +2452,7 @@
           <a:p>
             <a:fld id="{A0229028-759D-4210-9927-1485AD01E42E}" type="slidenum">
               <a:rPr lang="en-DE" smtClean="0"/>
-              <a:t>‹Nr.›</a:t>
+              <a:t>‹#›</a:t>
             </a:fld>
             <a:endParaRPr lang="en-DE"/>
           </a:p>
@@ -2687,7 +2687,7 @@
           <a:p>
             <a:fld id="{D5B82AE6-E612-48AC-BCA1-8D558D7A7716}" type="datetimeFigureOut">
               <a:rPr lang="en-DE" smtClean="0"/>
-              <a:t>28/11/2022</a:t>
+              <a:t>31/12/2022</a:t>
             </a:fld>
             <a:endParaRPr lang="en-DE"/>
           </a:p>
@@ -2741,7 +2741,7 @@
           <a:p>
             <a:fld id="{A0229028-759D-4210-9927-1485AD01E42E}" type="slidenum">
               <a:rPr lang="en-DE" smtClean="0"/>
-              <a:t>‹Nr.›</a:t>
+              <a:t>‹#›</a:t>
             </a:fld>
             <a:endParaRPr lang="en-DE"/>
           </a:p>
@@ -2930,7 +2930,7 @@
           <a:p>
             <a:fld id="{D5B82AE6-E612-48AC-BCA1-8D558D7A7716}" type="datetimeFigureOut">
               <a:rPr lang="en-DE" smtClean="0"/>
-              <a:t>28/11/2022</a:t>
+              <a:t>31/12/2022</a:t>
             </a:fld>
             <a:endParaRPr lang="en-DE"/>
           </a:p>
@@ -3020,7 +3020,7 @@
           <a:p>
             <a:fld id="{A0229028-759D-4210-9927-1485AD01E42E}" type="slidenum">
               <a:rPr lang="en-DE" smtClean="0"/>
-              <a:t>‹Nr.›</a:t>
+              <a:t>‹#›</a:t>
             </a:fld>
             <a:endParaRPr lang="en-DE"/>
           </a:p>
@@ -3457,16 +3457,12 @@
           <a:lstStyle/>
           <a:p>
             <a:r>
-              <a:rPr lang="en-GB" sz="2000" dirty="0" smtClean="0"/>
+              <a:rPr lang="en-GB" sz="2000" dirty="0"/>
               <a:t>This </a:t>
             </a:r>
             <a:r>
-              <a:rPr lang="en-US" dirty="0" smtClean="0"/>
-              <a:t>example </a:t>
-            </a:r>
-            <a:r>
               <a:rPr lang="en-US" dirty="0"/>
-              <a:t>follows the same setup as </a:t>
+              <a:t>example follows the same setup as </a:t>
             </a:r>
             <a:r>
               <a:rPr lang="en-US" dirty="0" err="1"/>
@@ -3474,15 +3470,15 @@
             </a:r>
             <a:r>
               <a:rPr lang="en-US" dirty="0"/>
-              <a:t>, but integrates </a:t>
-            </a:r>
-            <a:r>
-              <a:rPr lang="en-US" dirty="0" smtClean="0"/>
-              <a:t>the </a:t>
+              <a:t>, but integrates the Python service code into a synchronous service passing its data on to a synchronous sink. The remaining properties of the example are the same, except for that the communication here happens via </a:t>
+            </a:r>
+            <a:r>
+              <a:rPr lang="en-US" b="1" dirty="0"/>
+              <a:t>MQTT</a:t>
             </a:r>
             <a:r>
               <a:rPr lang="en-US" dirty="0"/>
-              <a:t>Python service code into a synchronous service passing its data on to a synchronous sink. The remaining properties of the example are the same.</a:t>
+              <a:t>.</a:t>
             </a:r>
             <a:endParaRPr lang="en-GB" sz="2000" dirty="0"/>
           </a:p>
@@ -4126,11 +4122,7 @@
           <a:p>
             <a:r>
               <a:rPr lang="en-GB" dirty="0"/>
-              <a:t>Routing </a:t>
-            </a:r>
-            <a:r>
-              <a:rPr lang="en-GB" dirty="0" smtClean="0"/>
-              <a:t>commands</a:t>
+              <a:t>Routing commands</a:t>
             </a:r>
             <a:endParaRPr lang="en-DE" dirty="0"/>
           </a:p>
@@ -4342,13 +4334,6 @@
   <p:clrMapOvr>
     <a:masterClrMapping/>
   </p:clrMapOvr>
-  <p:timing>
-    <p:tnLst>
-      <p:par>
-        <p:cTn id="1" dur="indefinite" restart="never" nodeType="tmRoot"/>
-      </p:par>
-    </p:tnLst>
-  </p:timing>
 </p:sld>
 </file>
 

</xml_diff>

<commit_message>
Second trial for MQTT #71
</commit_message>
<xml_diff>
--- a/platform/examples/examples.pythonSync/docs/Examples_PythonSync.pptx
+++ b/platform/examples/examples.pythonSync/docs/Examples_PythonSync.pptx
@@ -261,7 +261,7 @@
           <a:p>
             <a:fld id="{D5B82AE6-E612-48AC-BCA1-8D558D7A7716}" type="datetimeFigureOut">
               <a:rPr lang="en-DE" smtClean="0"/>
-              <a:t>31/12/2022</a:t>
+              <a:t>01/01/2023</a:t>
             </a:fld>
             <a:endParaRPr lang="en-DE"/>
           </a:p>
@@ -461,7 +461,7 @@
           <a:p>
             <a:fld id="{D5B82AE6-E612-48AC-BCA1-8D558D7A7716}" type="datetimeFigureOut">
               <a:rPr lang="en-DE" smtClean="0"/>
-              <a:t>31/12/2022</a:t>
+              <a:t>01/01/2023</a:t>
             </a:fld>
             <a:endParaRPr lang="en-DE"/>
           </a:p>
@@ -671,7 +671,7 @@
           <a:p>
             <a:fld id="{D5B82AE6-E612-48AC-BCA1-8D558D7A7716}" type="datetimeFigureOut">
               <a:rPr lang="en-DE" smtClean="0"/>
-              <a:t>31/12/2022</a:t>
+              <a:t>01/01/2023</a:t>
             </a:fld>
             <a:endParaRPr lang="en-DE"/>
           </a:p>
@@ -871,7 +871,7 @@
           <a:p>
             <a:fld id="{D5B82AE6-E612-48AC-BCA1-8D558D7A7716}" type="datetimeFigureOut">
               <a:rPr lang="en-DE" smtClean="0"/>
-              <a:t>31/12/2022</a:t>
+              <a:t>01/01/2023</a:t>
             </a:fld>
             <a:endParaRPr lang="en-DE"/>
           </a:p>
@@ -1147,7 +1147,7 @@
           <a:p>
             <a:fld id="{D5B82AE6-E612-48AC-BCA1-8D558D7A7716}" type="datetimeFigureOut">
               <a:rPr lang="en-DE" smtClean="0"/>
-              <a:t>31/12/2022</a:t>
+              <a:t>01/01/2023</a:t>
             </a:fld>
             <a:endParaRPr lang="en-DE"/>
           </a:p>
@@ -1415,7 +1415,7 @@
           <a:p>
             <a:fld id="{D5B82AE6-E612-48AC-BCA1-8D558D7A7716}" type="datetimeFigureOut">
               <a:rPr lang="en-DE" smtClean="0"/>
-              <a:t>31/12/2022</a:t>
+              <a:t>01/01/2023</a:t>
             </a:fld>
             <a:endParaRPr lang="en-DE"/>
           </a:p>
@@ -1830,7 +1830,7 @@
           <a:p>
             <a:fld id="{D5B82AE6-E612-48AC-BCA1-8D558D7A7716}" type="datetimeFigureOut">
               <a:rPr lang="en-DE" smtClean="0"/>
-              <a:t>31/12/2022</a:t>
+              <a:t>01/01/2023</a:t>
             </a:fld>
             <a:endParaRPr lang="en-DE"/>
           </a:p>
@@ -1972,7 +1972,7 @@
           <a:p>
             <a:fld id="{D5B82AE6-E612-48AC-BCA1-8D558D7A7716}" type="datetimeFigureOut">
               <a:rPr lang="en-DE" smtClean="0"/>
-              <a:t>31/12/2022</a:t>
+              <a:t>01/01/2023</a:t>
             </a:fld>
             <a:endParaRPr lang="en-DE"/>
           </a:p>
@@ -2085,7 +2085,7 @@
           <a:p>
             <a:fld id="{D5B82AE6-E612-48AC-BCA1-8D558D7A7716}" type="datetimeFigureOut">
               <a:rPr lang="en-DE" smtClean="0"/>
-              <a:t>31/12/2022</a:t>
+              <a:t>01/01/2023</a:t>
             </a:fld>
             <a:endParaRPr lang="en-DE"/>
           </a:p>
@@ -2398,7 +2398,7 @@
           <a:p>
             <a:fld id="{D5B82AE6-E612-48AC-BCA1-8D558D7A7716}" type="datetimeFigureOut">
               <a:rPr lang="en-DE" smtClean="0"/>
-              <a:t>31/12/2022</a:t>
+              <a:t>01/01/2023</a:t>
             </a:fld>
             <a:endParaRPr lang="en-DE"/>
           </a:p>
@@ -2687,7 +2687,7 @@
           <a:p>
             <a:fld id="{D5B82AE6-E612-48AC-BCA1-8D558D7A7716}" type="datetimeFigureOut">
               <a:rPr lang="en-DE" smtClean="0"/>
-              <a:t>31/12/2022</a:t>
+              <a:t>01/01/2023</a:t>
             </a:fld>
             <a:endParaRPr lang="en-DE"/>
           </a:p>
@@ -2930,7 +2930,7 @@
           <a:p>
             <a:fld id="{D5B82AE6-E612-48AC-BCA1-8D558D7A7716}" type="datetimeFigureOut">
               <a:rPr lang="en-DE" smtClean="0"/>
-              <a:t>31/12/2022</a:t>
+              <a:t>01/01/2023</a:t>
             </a:fld>
             <a:endParaRPr lang="en-DE"/>
           </a:p>
@@ -3470,11 +3470,15 @@
             </a:r>
             <a:r>
               <a:rPr lang="en-US" dirty="0"/>
-              <a:t>, but integrates the Python service code into a synchronous service passing its data on to a synchronous sink. The remaining properties of the example are </a:t>
-            </a:r>
-            <a:r>
-              <a:rPr lang="en-US"/>
-              <a:t>the same.</a:t>
+              <a:t>, but integrates the Python service code into a synchronous service passing its data on to a synchronous sink. The remaining properties of the example are the same except for that the communication happens with </a:t>
+            </a:r>
+            <a:r>
+              <a:rPr lang="en-US" b="1" dirty="0"/>
+              <a:t>MQTT</a:t>
+            </a:r>
+            <a:r>
+              <a:rPr lang="en-US" dirty="0"/>
+              <a:t>.</a:t>
             </a:r>
             <a:endParaRPr lang="en-GB" sz="2000" dirty="0"/>
           </a:p>

</xml_diff>